<commit_message>
added more of first blog post
</commit_message>
<xml_diff>
--- a/app/static/img/blog-started/Presentation1.pptx
+++ b/app/static/img/blog-started/Presentation1.pptx
@@ -6,6 +6,7 @@
   </p:sldMasterIdLst>
   <p:sldIdLst>
     <p:sldId id="256" r:id="rId2"/>
+    <p:sldId id="257" r:id="rId3"/>
   </p:sldIdLst>
   <p:sldSz cx="9144000" cy="6858000" type="screen4x3"/>
   <p:notesSz cx="6858000" cy="9144000"/>
@@ -3299,6 +3300,98 @@
     <p:extLst>
       <p:ext uri="{BB962C8B-B14F-4D97-AF65-F5344CB8AC3E}">
         <p14:creationId xmlns:p14="http://schemas.microsoft.com/office/powerpoint/2010/main" val="609967342"/>
+      </p:ext>
+    </p:extLst>
+  </p:cSld>
+  <p:clrMapOvr>
+    <a:masterClrMapping/>
+  </p:clrMapOvr>
+</p:sld>
+</file>
+
+<file path=ppt/slides/slide2.xml><?xml version="1.0" encoding="utf-8"?>
+<p:sld xmlns:a="http://schemas.openxmlformats.org/drawingml/2006/main" xmlns:r="http://schemas.openxmlformats.org/officeDocument/2006/relationships" xmlns:p="http://schemas.openxmlformats.org/presentationml/2006/main">
+  <p:cSld>
+    <p:spTree>
+      <p:nvGrpSpPr>
+        <p:cNvPr id="1" name=""/>
+        <p:cNvGrpSpPr/>
+        <p:nvPr/>
+      </p:nvGrpSpPr>
+      <p:grpSpPr>
+        <a:xfrm>
+          <a:off x="0" y="0"/>
+          <a:ext cx="0" cy="0"/>
+          <a:chOff x="0" y="0"/>
+          <a:chExt cx="0" cy="0"/>
+        </a:xfrm>
+      </p:grpSpPr>
+      <p:grpSp>
+        <p:nvGrpSpPr>
+          <p:cNvPr id="8" name="Group 7"/>
+          <p:cNvGrpSpPr/>
+          <p:nvPr/>
+        </p:nvGrpSpPr>
+        <p:grpSpPr>
+          <a:xfrm>
+            <a:off x="2260600" y="965200"/>
+            <a:ext cx="4610100" cy="4927600"/>
+            <a:chOff x="2260600" y="965200"/>
+            <a:chExt cx="4610100" cy="4927600"/>
+          </a:xfrm>
+        </p:grpSpPr>
+        <p:pic>
+          <p:nvPicPr>
+            <p:cNvPr id="6" name="Picture 5"/>
+            <p:cNvPicPr>
+              <a:picLocks noChangeAspect="1"/>
+            </p:cNvPicPr>
+            <p:nvPr/>
+          </p:nvPicPr>
+          <p:blipFill>
+            <a:blip r:embed="rId2"/>
+            <a:stretch>
+              <a:fillRect/>
+            </a:stretch>
+          </p:blipFill>
+          <p:spPr>
+            <a:xfrm>
+              <a:off x="2260600" y="965200"/>
+              <a:ext cx="4610100" cy="4927600"/>
+            </a:xfrm>
+            <a:prstGeom prst="rect">
+              <a:avLst/>
+            </a:prstGeom>
+          </p:spPr>
+        </p:pic>
+        <p:pic>
+          <p:nvPicPr>
+            <p:cNvPr id="7" name="Picture 6"/>
+            <p:cNvPicPr>
+              <a:picLocks noChangeAspect="1"/>
+            </p:cNvPicPr>
+            <p:nvPr/>
+          </p:nvPicPr>
+          <p:blipFill rotWithShape="1">
+            <a:blip r:embed="rId2"/>
+            <a:srcRect l="44765" r="4323" b="90142"/>
+            <a:stretch/>
+          </p:blipFill>
+          <p:spPr>
+            <a:xfrm>
+              <a:off x="4778375" y="1371600"/>
+              <a:ext cx="1841499" cy="485775"/>
+            </a:xfrm>
+            <a:prstGeom prst="rect">
+              <a:avLst/>
+            </a:prstGeom>
+          </p:spPr>
+        </p:pic>
+      </p:grpSp>
+    </p:spTree>
+    <p:extLst>
+      <p:ext uri="{BB962C8B-B14F-4D97-AF65-F5344CB8AC3E}">
+        <p14:creationId xmlns:p14="http://schemas.microsoft.com/office/powerpoint/2010/main" val="1432653584"/>
       </p:ext>
     </p:extLst>
   </p:cSld>

</xml_diff>